<commit_message>
last update before presentation
</commit_message>
<xml_diff>
--- a/P1M2_lusitania.pptx
+++ b/P1M2_lusitania.pptx
@@ -7314,7 +7314,7 @@
         <p:spPr>
           <a:xfrm>
             <a:off x="1148862" y="2782277"/>
-            <a:ext cx="10392525" cy="1370503"/>
+            <a:ext cx="9685600" cy="1370503"/>
           </a:xfrm>
           <a:prstGeom prst="rect">
             <a:avLst/>
@@ -7364,19 +7364,15 @@
             </a:pPr>
             <a:r>
               <a:rPr lang="en-ID" sz="1400" dirty="0"/>
-              <a:t>Dashboard Data Viz </a:t>
-            </a:r>
-            <a:r>
-              <a:rPr lang="en-ID" sz="1400"/>
-              <a:t>: </a:t>
-            </a:r>
-            <a:r>
-              <a:rPr lang="en-ID" sz="1400">
+              <a:t>Dashboard	: </a:t>
+            </a:r>
+            <a:r>
+              <a:rPr lang="en-ID" sz="1400" dirty="0">
                 <a:hlinkClick r:id="rId4"/>
               </a:rPr>
               <a:t>https://public.tableau.com/app/profile/lusitania.ragil.cahyaningsih/viz/P1M2_lusitania/dash_viz?publish=yes</a:t>
             </a:r>
-            <a:endParaRPr lang="en-ID" sz="1400"/>
+            <a:endParaRPr lang="en-ID" sz="1400" dirty="0"/>
           </a:p>
           <a:p>
             <a:pPr>
@@ -20899,12 +20895,23 @@
 </file>
 
 <file path=customXml/item1.xml><?xml version="1.0" encoding="utf-8"?>
-<?mso-contentType ?>
-<FormTemplates xmlns="http://schemas.microsoft.com/sharepoint/v3/contenttype/forms">
-  <Display>DocumentLibraryForm</Display>
-  <Edit>DocumentLibraryForm</Edit>
-  <New>DocumentLibraryForm</New>
-</FormTemplates>
+<p:properties xmlns:p="http://schemas.microsoft.com/office/2006/metadata/properties" xmlns:xsi="http://www.w3.org/2001/XMLSchema-instance" xmlns:pc="http://schemas.microsoft.com/office/infopath/2007/PartnerControls">
+  <documentManagement>
+    <_ip_UnifiedCompliancePolicyUIAction xmlns="http://schemas.microsoft.com/sharepoint/v3" xsi:nil="true"/>
+    <Image xmlns="71af3243-3dd4-4a8d-8c0d-dd76da1f02a5">
+      <Url xsi:nil="true"/>
+      <Description xsi:nil="true"/>
+    </Image>
+    <Status xmlns="71af3243-3dd4-4a8d-8c0d-dd76da1f02a5">Not started</Status>
+    <Background xmlns="71af3243-3dd4-4a8d-8c0d-dd76da1f02a5">false</Background>
+    <_ip_UnifiedCompliancePolicyProperties xmlns="http://schemas.microsoft.com/sharepoint/v3" xsi:nil="true"/>
+    <ImageTagsTaxHTField xmlns="71af3243-3dd4-4a8d-8c0d-dd76da1f02a5">
+      <Terms xmlns="http://schemas.microsoft.com/office/infopath/2007/PartnerControls"/>
+    </ImageTagsTaxHTField>
+    <TaxCatchAll xmlns="230e9df3-be65-4c73-a93b-d1236ebd677e" xsi:nil="true"/>
+    <MediaServiceKeyPoints xmlns="71af3243-3dd4-4a8d-8c0d-dd76da1f02a5" xsi:nil="true"/>
+  </documentManagement>
+</p:properties>
 </file>
 
 <file path=customXml/item2.xml><?xml version="1.0" encoding="utf-8"?>
@@ -21214,29 +21221,29 @@
 </file>
 
 <file path=customXml/item3.xml><?xml version="1.0" encoding="utf-8"?>
-<p:properties xmlns:p="http://schemas.microsoft.com/office/2006/metadata/properties" xmlns:xsi="http://www.w3.org/2001/XMLSchema-instance" xmlns:pc="http://schemas.microsoft.com/office/infopath/2007/PartnerControls">
-  <documentManagement>
-    <_ip_UnifiedCompliancePolicyUIAction xmlns="http://schemas.microsoft.com/sharepoint/v3" xsi:nil="true"/>
-    <Image xmlns="71af3243-3dd4-4a8d-8c0d-dd76da1f02a5">
-      <Url xsi:nil="true"/>
-      <Description xsi:nil="true"/>
-    </Image>
-    <Status xmlns="71af3243-3dd4-4a8d-8c0d-dd76da1f02a5">Not started</Status>
-    <Background xmlns="71af3243-3dd4-4a8d-8c0d-dd76da1f02a5">false</Background>
-    <_ip_UnifiedCompliancePolicyProperties xmlns="http://schemas.microsoft.com/sharepoint/v3" xsi:nil="true"/>
-    <ImageTagsTaxHTField xmlns="71af3243-3dd4-4a8d-8c0d-dd76da1f02a5">
-      <Terms xmlns="http://schemas.microsoft.com/office/infopath/2007/PartnerControls"/>
-    </ImageTagsTaxHTField>
-    <TaxCatchAll xmlns="230e9df3-be65-4c73-a93b-d1236ebd677e" xsi:nil="true"/>
-    <MediaServiceKeyPoints xmlns="71af3243-3dd4-4a8d-8c0d-dd76da1f02a5" xsi:nil="true"/>
-  </documentManagement>
-</p:properties>
+<?mso-contentType ?>
+<FormTemplates xmlns="http://schemas.microsoft.com/sharepoint/v3/contenttype/forms">
+  <Display>DocumentLibraryForm</Display>
+  <Edit>DocumentLibraryForm</Edit>
+  <New>DocumentLibraryForm</New>
+</FormTemplates>
 </file>
 
 <file path=customXml/itemProps1.xml><?xml version="1.0" encoding="utf-8"?>
-<ds:datastoreItem xmlns:ds="http://schemas.openxmlformats.org/officeDocument/2006/customXml" ds:itemID="{5563EE24-83AF-4B4D-B45B-11D1ECD4364A}">
+<ds:datastoreItem xmlns:ds="http://schemas.openxmlformats.org/officeDocument/2006/customXml" ds:itemID="{5A3EE4EA-81C0-48D0-BEBD-A2EFD6B38B42}">
   <ds:schemaRefs>
-    <ds:schemaRef ds:uri="http://schemas.microsoft.com/sharepoint/v3/contenttype/forms"/>
+    <ds:schemaRef ds:uri="http://schemas.microsoft.com/office/infopath/2007/PartnerControls"/>
+    <ds:schemaRef ds:uri="http://schemas.openxmlformats.org/package/2006/metadata/core-properties"/>
+    <ds:schemaRef ds:uri="http://schemas.microsoft.com/sharepoint/v3"/>
+    <ds:schemaRef ds:uri="http://purl.org/dc/dcmitype/"/>
+    <ds:schemaRef ds:uri="71af3243-3dd4-4a8d-8c0d-dd76da1f02a5"/>
+    <ds:schemaRef ds:uri="http://schemas.microsoft.com/office/2006/documentManagement/types"/>
+    <ds:schemaRef ds:uri="http://purl.org/dc/terms/"/>
+    <ds:schemaRef ds:uri="230e9df3-be65-4c73-a93b-d1236ebd677e"/>
+    <ds:schemaRef ds:uri="16c05727-aa75-4e4a-9b5f-8a80a1165891"/>
+    <ds:schemaRef ds:uri="http://schemas.microsoft.com/office/2006/metadata/properties"/>
+    <ds:schemaRef ds:uri="http://www.w3.org/XML/1998/namespace"/>
+    <ds:schemaRef ds:uri="http://purl.org/dc/elements/1.1/"/>
   </ds:schemaRefs>
 </ds:datastoreItem>
 </file>
@@ -21263,20 +21270,9 @@
 </file>
 
 <file path=customXml/itemProps3.xml><?xml version="1.0" encoding="utf-8"?>
-<ds:datastoreItem xmlns:ds="http://schemas.openxmlformats.org/officeDocument/2006/customXml" ds:itemID="{5A3EE4EA-81C0-48D0-BEBD-A2EFD6B38B42}">
+<ds:datastoreItem xmlns:ds="http://schemas.openxmlformats.org/officeDocument/2006/customXml" ds:itemID="{5563EE24-83AF-4B4D-B45B-11D1ECD4364A}">
   <ds:schemaRefs>
-    <ds:schemaRef ds:uri="http://schemas.microsoft.com/office/infopath/2007/PartnerControls"/>
-    <ds:schemaRef ds:uri="http://schemas.openxmlformats.org/package/2006/metadata/core-properties"/>
-    <ds:schemaRef ds:uri="http://schemas.microsoft.com/sharepoint/v3"/>
-    <ds:schemaRef ds:uri="http://purl.org/dc/dcmitype/"/>
-    <ds:schemaRef ds:uri="71af3243-3dd4-4a8d-8c0d-dd76da1f02a5"/>
-    <ds:schemaRef ds:uri="http://schemas.microsoft.com/office/2006/documentManagement/types"/>
-    <ds:schemaRef ds:uri="http://purl.org/dc/terms/"/>
-    <ds:schemaRef ds:uri="230e9df3-be65-4c73-a93b-d1236ebd677e"/>
-    <ds:schemaRef ds:uri="16c05727-aa75-4e4a-9b5f-8a80a1165891"/>
-    <ds:schemaRef ds:uri="http://schemas.microsoft.com/office/2006/metadata/properties"/>
-    <ds:schemaRef ds:uri="http://www.w3.org/XML/1998/namespace"/>
-    <ds:schemaRef ds:uri="http://purl.org/dc/elements/1.1/"/>
+    <ds:schemaRef ds:uri="http://schemas.microsoft.com/sharepoint/v3/contenttype/forms"/>
   </ds:schemaRefs>
 </ds:datastoreItem>
 </file>
</xml_diff>